<commit_message>
CGHcall.R produces data to simulate the work of the GMM. it also produces more plots. empty ppt was created for slides on CGHcall
</commit_message>
<xml_diff>
--- a/docs/docs_I_made/slides_packages_CGHcall.pptx
+++ b/docs/docs_I_made/slides_packages_CGHcall.pptx
@@ -104,6 +104,11 @@
       </a:defRPr>
     </a:lvl9pPr>
   </p:defaultTextStyle>
+  <p:extLst>
+    <p:ext uri="{EFAFB233-063F-42B5-8137-9DF3F51BA10A}">
+      <p15:sldGuideLst xmlns:p15="http://schemas.microsoft.com/office/powerpoint/2012/main"/>
+    </p:ext>
+  </p:extLst>
 </p:presentation>
 </file>
 
@@ -830,7 +835,7 @@
             <a:fld id="{B61BEF0D-F0BB-DE4B-95CE-6DB70DBA9567}" type="datetimeFigureOut">
               <a:rPr lang="en-US" dirty="0"/>
               <a:pPr/>
-              <a:t>3/15/2022</a:t>
+              <a:t>3/16/2022</a:t>
             </a:fld>
             <a:endParaRPr lang="en-US" dirty="0"/>
           </a:p>
@@ -1078,7 +1083,7 @@
             <a:fld id="{B61BEF0D-F0BB-DE4B-95CE-6DB70DBA9567}" type="datetimeFigureOut">
               <a:rPr lang="en-US" dirty="0"/>
               <a:pPr/>
-              <a:t>3/15/2022</a:t>
+              <a:t>3/16/2022</a:t>
             </a:fld>
             <a:endParaRPr lang="en-US" dirty="0"/>
           </a:p>
@@ -1389,7 +1394,7 @@
             <a:fld id="{B61BEF0D-F0BB-DE4B-95CE-6DB70DBA9567}" type="datetimeFigureOut">
               <a:rPr lang="en-US" dirty="0"/>
               <a:pPr/>
-              <a:t>3/15/2022</a:t>
+              <a:t>3/16/2022</a:t>
             </a:fld>
             <a:endParaRPr lang="en-US" dirty="0"/>
           </a:p>
@@ -1727,7 +1732,7 @@
             <a:fld id="{B61BEF0D-F0BB-DE4B-95CE-6DB70DBA9567}" type="datetimeFigureOut">
               <a:rPr lang="en-US" dirty="0"/>
               <a:pPr/>
-              <a:t>3/15/2022</a:t>
+              <a:t>3/16/2022</a:t>
             </a:fld>
             <a:endParaRPr lang="en-US" dirty="0"/>
           </a:p>
@@ -2038,7 +2043,7 @@
             <a:fld id="{B61BEF0D-F0BB-DE4B-95CE-6DB70DBA9567}" type="datetimeFigureOut">
               <a:rPr lang="en-US" dirty="0"/>
               <a:pPr/>
-              <a:t>3/15/2022</a:t>
+              <a:t>3/16/2022</a:t>
             </a:fld>
             <a:endParaRPr lang="en-US" dirty="0"/>
           </a:p>
@@ -2428,7 +2433,7 @@
             <a:fld id="{B61BEF0D-F0BB-DE4B-95CE-6DB70DBA9567}" type="datetimeFigureOut">
               <a:rPr lang="en-US" dirty="0"/>
               <a:pPr/>
-              <a:t>3/15/2022</a:t>
+              <a:t>3/16/2022</a:t>
             </a:fld>
             <a:endParaRPr lang="en-US" dirty="0"/>
           </a:p>
@@ -2594,7 +2599,7 @@
           <a:p>
             <a:fld id="{55C6B4A9-1611-4792-9094-5F34BCA07E0B}" type="datetimeFigureOut">
               <a:rPr lang="en-US" dirty="0"/>
-              <a:t>3/15/2022</a:t>
+              <a:t>3/16/2022</a:t>
             </a:fld>
             <a:endParaRPr lang="en-US" dirty="0"/>
           </a:p>
@@ -2770,7 +2775,7 @@
             <a:fld id="{B61BEF0D-F0BB-DE4B-95CE-6DB70DBA9567}" type="datetimeFigureOut">
               <a:rPr lang="en-US" dirty="0"/>
               <a:pPr/>
-              <a:t>3/15/2022</a:t>
+              <a:t>3/16/2022</a:t>
             </a:fld>
             <a:endParaRPr lang="en-US" dirty="0"/>
           </a:p>
@@ -2943,7 +2948,7 @@
             <a:fld id="{B61BEF0D-F0BB-DE4B-95CE-6DB70DBA9567}" type="datetimeFigureOut">
               <a:rPr lang="en-US" dirty="0"/>
               <a:pPr/>
-              <a:t>3/15/2022</a:t>
+              <a:t>3/16/2022</a:t>
             </a:fld>
             <a:endParaRPr lang="en-US" dirty="0"/>
           </a:p>
@@ -3187,7 +3192,7 @@
             <a:fld id="{B61BEF0D-F0BB-DE4B-95CE-6DB70DBA9567}" type="datetimeFigureOut">
               <a:rPr lang="en-US" dirty="0"/>
               <a:pPr/>
-              <a:t>3/15/2022</a:t>
+              <a:t>3/16/2022</a:t>
             </a:fld>
             <a:endParaRPr lang="en-US" dirty="0"/>
           </a:p>
@@ -3415,7 +3420,7 @@
           <a:p>
             <a:fld id="{EB712588-04B1-427B-82EE-E8DB90309F08}" type="datetimeFigureOut">
               <a:rPr lang="en-US" dirty="0"/>
-              <a:t>3/15/2022</a:t>
+              <a:t>3/16/2022</a:t>
             </a:fld>
             <a:endParaRPr lang="en-US" dirty="0"/>
           </a:p>
@@ -3785,7 +3790,7 @@
             <a:fld id="{B61BEF0D-F0BB-DE4B-95CE-6DB70DBA9567}" type="datetimeFigureOut">
               <a:rPr lang="en-US" dirty="0"/>
               <a:pPr/>
-              <a:t>3/15/2022</a:t>
+              <a:t>3/16/2022</a:t>
             </a:fld>
             <a:endParaRPr lang="en-US" dirty="0"/>
           </a:p>
@@ -3905,7 +3910,7 @@
             <a:fld id="{B61BEF0D-F0BB-DE4B-95CE-6DB70DBA9567}" type="datetimeFigureOut">
               <a:rPr lang="en-US" dirty="0"/>
               <a:pPr/>
-              <a:t>3/15/2022</a:t>
+              <a:t>3/16/2022</a:t>
             </a:fld>
             <a:endParaRPr lang="en-US" dirty="0"/>
           </a:p>
@@ -3997,7 +4002,7 @@
             <a:fld id="{B61BEF0D-F0BB-DE4B-95CE-6DB70DBA9567}" type="datetimeFigureOut">
               <a:rPr lang="en-US" dirty="0"/>
               <a:pPr/>
-              <a:t>3/15/2022</a:t>
+              <a:t>3/16/2022</a:t>
             </a:fld>
             <a:endParaRPr lang="en-US" dirty="0"/>
           </a:p>
@@ -4248,7 +4253,7 @@
           <a:p>
             <a:fld id="{42A54C80-263E-416B-A8E0-580EDEADCBDC}" type="datetimeFigureOut">
               <a:rPr lang="en-US" dirty="0"/>
-              <a:t>3/15/2022</a:t>
+              <a:t>3/16/2022</a:t>
             </a:fld>
             <a:endParaRPr lang="en-US" dirty="0"/>
           </a:p>
@@ -4507,7 +4512,7 @@
             <a:fld id="{B61BEF0D-F0BB-DE4B-95CE-6DB70DBA9567}" type="datetimeFigureOut">
               <a:rPr lang="en-US" dirty="0"/>
               <a:pPr/>
-              <a:t>3/15/2022</a:t>
+              <a:t>3/16/2022</a:t>
             </a:fld>
             <a:endParaRPr lang="en-US" dirty="0"/>
           </a:p>
@@ -5247,7 +5252,7 @@
             <a:fld id="{B61BEF0D-F0BB-DE4B-95CE-6DB70DBA9567}" type="datetimeFigureOut">
               <a:rPr lang="en-US" dirty="0"/>
               <a:pPr/>
-              <a:t>3/15/2022</a:t>
+              <a:t>3/16/2022</a:t>
             </a:fld>
             <a:endParaRPr lang="en-US" dirty="0"/>
           </a:p>

</xml_diff>

<commit_message>
bergupdate: took notes on EaCoN, gotta dive more in it.
</commit_message>
<xml_diff>
--- a/docs/docs_I_made/slides_packages_CGHcall.pptx
+++ b/docs/docs_I_made/slides_packages_CGHcall.pptx
@@ -6,6 +6,7 @@
   </p:sldMasterIdLst>
   <p:sldIdLst>
     <p:sldId id="256" r:id="rId2"/>
+    <p:sldId id="260" r:id="rId3"/>
   </p:sldIdLst>
   <p:sldSz cx="12192000" cy="6858000"/>
   <p:notesSz cx="6858000" cy="9144000"/>
@@ -835,7 +836,7 @@
             <a:fld id="{B61BEF0D-F0BB-DE4B-95CE-6DB70DBA9567}" type="datetimeFigureOut">
               <a:rPr lang="en-US" dirty="0"/>
               <a:pPr/>
-              <a:t>3/16/2022</a:t>
+              <a:t>3/18/2022</a:t>
             </a:fld>
             <a:endParaRPr lang="en-US" dirty="0"/>
           </a:p>
@@ -1083,7 +1084,7 @@
             <a:fld id="{B61BEF0D-F0BB-DE4B-95CE-6DB70DBA9567}" type="datetimeFigureOut">
               <a:rPr lang="en-US" dirty="0"/>
               <a:pPr/>
-              <a:t>3/16/2022</a:t>
+              <a:t>3/18/2022</a:t>
             </a:fld>
             <a:endParaRPr lang="en-US" dirty="0"/>
           </a:p>
@@ -1394,7 +1395,7 @@
             <a:fld id="{B61BEF0D-F0BB-DE4B-95CE-6DB70DBA9567}" type="datetimeFigureOut">
               <a:rPr lang="en-US" dirty="0"/>
               <a:pPr/>
-              <a:t>3/16/2022</a:t>
+              <a:t>3/18/2022</a:t>
             </a:fld>
             <a:endParaRPr lang="en-US" dirty="0"/>
           </a:p>
@@ -1732,7 +1733,7 @@
             <a:fld id="{B61BEF0D-F0BB-DE4B-95CE-6DB70DBA9567}" type="datetimeFigureOut">
               <a:rPr lang="en-US" dirty="0"/>
               <a:pPr/>
-              <a:t>3/16/2022</a:t>
+              <a:t>3/18/2022</a:t>
             </a:fld>
             <a:endParaRPr lang="en-US" dirty="0"/>
           </a:p>
@@ -2043,7 +2044,7 @@
             <a:fld id="{B61BEF0D-F0BB-DE4B-95CE-6DB70DBA9567}" type="datetimeFigureOut">
               <a:rPr lang="en-US" dirty="0"/>
               <a:pPr/>
-              <a:t>3/16/2022</a:t>
+              <a:t>3/18/2022</a:t>
             </a:fld>
             <a:endParaRPr lang="en-US" dirty="0"/>
           </a:p>
@@ -2433,7 +2434,7 @@
             <a:fld id="{B61BEF0D-F0BB-DE4B-95CE-6DB70DBA9567}" type="datetimeFigureOut">
               <a:rPr lang="en-US" dirty="0"/>
               <a:pPr/>
-              <a:t>3/16/2022</a:t>
+              <a:t>3/18/2022</a:t>
             </a:fld>
             <a:endParaRPr lang="en-US" dirty="0"/>
           </a:p>
@@ -2599,7 +2600,7 @@
           <a:p>
             <a:fld id="{55C6B4A9-1611-4792-9094-5F34BCA07E0B}" type="datetimeFigureOut">
               <a:rPr lang="en-US" dirty="0"/>
-              <a:t>3/16/2022</a:t>
+              <a:t>3/18/2022</a:t>
             </a:fld>
             <a:endParaRPr lang="en-US" dirty="0"/>
           </a:p>
@@ -2775,7 +2776,7 @@
             <a:fld id="{B61BEF0D-F0BB-DE4B-95CE-6DB70DBA9567}" type="datetimeFigureOut">
               <a:rPr lang="en-US" dirty="0"/>
               <a:pPr/>
-              <a:t>3/16/2022</a:t>
+              <a:t>3/18/2022</a:t>
             </a:fld>
             <a:endParaRPr lang="en-US" dirty="0"/>
           </a:p>
@@ -2948,7 +2949,7 @@
             <a:fld id="{B61BEF0D-F0BB-DE4B-95CE-6DB70DBA9567}" type="datetimeFigureOut">
               <a:rPr lang="en-US" dirty="0"/>
               <a:pPr/>
-              <a:t>3/16/2022</a:t>
+              <a:t>3/18/2022</a:t>
             </a:fld>
             <a:endParaRPr lang="en-US" dirty="0"/>
           </a:p>
@@ -3192,7 +3193,7 @@
             <a:fld id="{B61BEF0D-F0BB-DE4B-95CE-6DB70DBA9567}" type="datetimeFigureOut">
               <a:rPr lang="en-US" dirty="0"/>
               <a:pPr/>
-              <a:t>3/16/2022</a:t>
+              <a:t>3/18/2022</a:t>
             </a:fld>
             <a:endParaRPr lang="en-US" dirty="0"/>
           </a:p>
@@ -3420,7 +3421,7 @@
           <a:p>
             <a:fld id="{EB712588-04B1-427B-82EE-E8DB90309F08}" type="datetimeFigureOut">
               <a:rPr lang="en-US" dirty="0"/>
-              <a:t>3/16/2022</a:t>
+              <a:t>3/18/2022</a:t>
             </a:fld>
             <a:endParaRPr lang="en-US" dirty="0"/>
           </a:p>
@@ -3790,7 +3791,7 @@
             <a:fld id="{B61BEF0D-F0BB-DE4B-95CE-6DB70DBA9567}" type="datetimeFigureOut">
               <a:rPr lang="en-US" dirty="0"/>
               <a:pPr/>
-              <a:t>3/16/2022</a:t>
+              <a:t>3/18/2022</a:t>
             </a:fld>
             <a:endParaRPr lang="en-US" dirty="0"/>
           </a:p>
@@ -3910,7 +3911,7 @@
             <a:fld id="{B61BEF0D-F0BB-DE4B-95CE-6DB70DBA9567}" type="datetimeFigureOut">
               <a:rPr lang="en-US" dirty="0"/>
               <a:pPr/>
-              <a:t>3/16/2022</a:t>
+              <a:t>3/18/2022</a:t>
             </a:fld>
             <a:endParaRPr lang="en-US" dirty="0"/>
           </a:p>
@@ -4002,7 +4003,7 @@
             <a:fld id="{B61BEF0D-F0BB-DE4B-95CE-6DB70DBA9567}" type="datetimeFigureOut">
               <a:rPr lang="en-US" dirty="0"/>
               <a:pPr/>
-              <a:t>3/16/2022</a:t>
+              <a:t>3/18/2022</a:t>
             </a:fld>
             <a:endParaRPr lang="en-US" dirty="0"/>
           </a:p>
@@ -4253,7 +4254,7 @@
           <a:p>
             <a:fld id="{42A54C80-263E-416B-A8E0-580EDEADCBDC}" type="datetimeFigureOut">
               <a:rPr lang="en-US" dirty="0"/>
-              <a:t>3/16/2022</a:t>
+              <a:t>3/18/2022</a:t>
             </a:fld>
             <a:endParaRPr lang="en-US" dirty="0"/>
           </a:p>
@@ -4512,7 +4513,7 @@
             <a:fld id="{B61BEF0D-F0BB-DE4B-95CE-6DB70DBA9567}" type="datetimeFigureOut">
               <a:rPr lang="en-US" dirty="0"/>
               <a:pPr/>
-              <a:t>3/16/2022</a:t>
+              <a:t>3/18/2022</a:t>
             </a:fld>
             <a:endParaRPr lang="en-US" dirty="0"/>
           </a:p>
@@ -5252,7 +5253,7 @@
             <a:fld id="{B61BEF0D-F0BB-DE4B-95CE-6DB70DBA9567}" type="datetimeFigureOut">
               <a:rPr lang="en-US" dirty="0"/>
               <a:pPr/>
-              <a:t>3/16/2022</a:t>
+              <a:t>3/18/2022</a:t>
             </a:fld>
             <a:endParaRPr lang="en-US" dirty="0"/>
           </a:p>
@@ -5831,6 +5832,101 @@
   <p:clrMapOvr>
     <a:masterClrMapping/>
   </p:clrMapOvr>
+  <p:timing>
+    <p:tnLst>
+      <p:par>
+        <p:cTn id="1" dur="indefinite" restart="never" nodeType="tmRoot"/>
+      </p:par>
+    </p:tnLst>
+  </p:timing>
+</p:sld>
+</file>
+
+<file path=ppt/slides/slide2.xml><?xml version="1.0" encoding="utf-8"?>
+<p:sld xmlns:a="http://schemas.openxmlformats.org/drawingml/2006/main" xmlns:r="http://schemas.openxmlformats.org/officeDocument/2006/relationships" xmlns:p="http://schemas.openxmlformats.org/presentationml/2006/main">
+  <p:cSld>
+    <p:spTree>
+      <p:nvGrpSpPr>
+        <p:cNvPr id="1" name=""/>
+        <p:cNvGrpSpPr/>
+        <p:nvPr/>
+      </p:nvGrpSpPr>
+      <p:grpSpPr>
+        <a:xfrm>
+          <a:off x="0" y="0"/>
+          <a:ext cx="0" cy="0"/>
+          <a:chOff x="0" y="0"/>
+          <a:chExt cx="0" cy="0"/>
+        </a:xfrm>
+      </p:grpSpPr>
+      <p:sp>
+        <p:nvSpPr>
+          <p:cNvPr id="2" name="Titre 1"/>
+          <p:cNvSpPr>
+            <a:spLocks noGrp="1"/>
+          </p:cNvSpPr>
+          <p:nvPr>
+            <p:ph type="title"/>
+          </p:nvPr>
+        </p:nvSpPr>
+        <p:spPr/>
+        <p:txBody>
+          <a:bodyPr/>
+          <a:lstStyle/>
+          <a:p>
+            <a:r>
+              <a:rPr lang="fr-FR" dirty="0"/>
+              <a:t>Première normalisation</a:t>
+            </a:r>
+          </a:p>
+        </p:txBody>
+      </p:sp>
+      <p:pic>
+        <p:nvPicPr>
+          <p:cNvPr id="8" name="Espace réservé du contenu 7"/>
+          <p:cNvPicPr>
+            <a:picLocks noGrp="1" noChangeAspect="1"/>
+          </p:cNvPicPr>
+          <p:nvPr>
+            <p:ph idx="1"/>
+          </p:nvPr>
+        </p:nvPicPr>
+        <p:blipFill>
+          <a:blip r:embed="rId2">
+            <a:extLst>
+              <a:ext uri="{28A0092B-C50C-407E-A947-70E740481C1C}">
+                <a14:useLocalDpi xmlns:a14="http://schemas.microsoft.com/office/drawing/2010/main" val="0"/>
+              </a:ext>
+            </a:extLst>
+          </a:blip>
+          <a:stretch>
+            <a:fillRect/>
+          </a:stretch>
+        </p:blipFill>
+        <p:spPr>
+          <a:xfrm>
+            <a:off x="2740498" y="1721852"/>
+            <a:ext cx="5761818" cy="4590249"/>
+          </a:xfrm>
+        </p:spPr>
+      </p:pic>
+    </p:spTree>
+    <p:extLst>
+      <p:ext uri="{BB962C8B-B14F-4D97-AF65-F5344CB8AC3E}">
+        <p14:creationId xmlns:p14="http://schemas.microsoft.com/office/powerpoint/2010/main" val="845266628"/>
+      </p:ext>
+    </p:extLst>
+  </p:cSld>
+  <p:clrMapOvr>
+    <a:masterClrMapping/>
+  </p:clrMapOvr>
+  <p:timing>
+    <p:tnLst>
+      <p:par>
+        <p:cTn id="1" dur="indefinite" restart="never" nodeType="tmRoot"/>
+      </p:par>
+    </p:tnLst>
+  </p:timing>
 </p:sld>
 </file>
 

</xml_diff>

<commit_message>
bergupdate : added notes on ASCAT
</commit_message>
<xml_diff>
--- a/docs/docs_I_made/slides_packages_CGHcall.pptx
+++ b/docs/docs_I_made/slides_packages_CGHcall.pptx
@@ -6,7 +6,11 @@
   </p:sldMasterIdLst>
   <p:sldIdLst>
     <p:sldId id="256" r:id="rId2"/>
-    <p:sldId id="260" r:id="rId3"/>
+    <p:sldId id="261" r:id="rId3"/>
+    <p:sldId id="266" r:id="rId4"/>
+    <p:sldId id="260" r:id="rId5"/>
+    <p:sldId id="267" r:id="rId6"/>
+    <p:sldId id="269" r:id="rId7"/>
   </p:sldIdLst>
   <p:sldSz cx="12192000" cy="6858000"/>
   <p:notesSz cx="6858000" cy="9144000"/>
@@ -836,7 +840,7 @@
             <a:fld id="{B61BEF0D-F0BB-DE4B-95CE-6DB70DBA9567}" type="datetimeFigureOut">
               <a:rPr lang="en-US" dirty="0"/>
               <a:pPr/>
-              <a:t>3/18/2022</a:t>
+              <a:t>3/22/2022</a:t>
             </a:fld>
             <a:endParaRPr lang="en-US" dirty="0"/>
           </a:p>
@@ -1084,7 +1088,7 @@
             <a:fld id="{B61BEF0D-F0BB-DE4B-95CE-6DB70DBA9567}" type="datetimeFigureOut">
               <a:rPr lang="en-US" dirty="0"/>
               <a:pPr/>
-              <a:t>3/18/2022</a:t>
+              <a:t>3/22/2022</a:t>
             </a:fld>
             <a:endParaRPr lang="en-US" dirty="0"/>
           </a:p>
@@ -1395,7 +1399,7 @@
             <a:fld id="{B61BEF0D-F0BB-DE4B-95CE-6DB70DBA9567}" type="datetimeFigureOut">
               <a:rPr lang="en-US" dirty="0"/>
               <a:pPr/>
-              <a:t>3/18/2022</a:t>
+              <a:t>3/22/2022</a:t>
             </a:fld>
             <a:endParaRPr lang="en-US" dirty="0"/>
           </a:p>
@@ -1733,7 +1737,7 @@
             <a:fld id="{B61BEF0D-F0BB-DE4B-95CE-6DB70DBA9567}" type="datetimeFigureOut">
               <a:rPr lang="en-US" dirty="0"/>
               <a:pPr/>
-              <a:t>3/18/2022</a:t>
+              <a:t>3/22/2022</a:t>
             </a:fld>
             <a:endParaRPr lang="en-US" dirty="0"/>
           </a:p>
@@ -2044,7 +2048,7 @@
             <a:fld id="{B61BEF0D-F0BB-DE4B-95CE-6DB70DBA9567}" type="datetimeFigureOut">
               <a:rPr lang="en-US" dirty="0"/>
               <a:pPr/>
-              <a:t>3/18/2022</a:t>
+              <a:t>3/22/2022</a:t>
             </a:fld>
             <a:endParaRPr lang="en-US" dirty="0"/>
           </a:p>
@@ -2434,7 +2438,7 @@
             <a:fld id="{B61BEF0D-F0BB-DE4B-95CE-6DB70DBA9567}" type="datetimeFigureOut">
               <a:rPr lang="en-US" dirty="0"/>
               <a:pPr/>
-              <a:t>3/18/2022</a:t>
+              <a:t>3/22/2022</a:t>
             </a:fld>
             <a:endParaRPr lang="en-US" dirty="0"/>
           </a:p>
@@ -2600,7 +2604,7 @@
           <a:p>
             <a:fld id="{55C6B4A9-1611-4792-9094-5F34BCA07E0B}" type="datetimeFigureOut">
               <a:rPr lang="en-US" dirty="0"/>
-              <a:t>3/18/2022</a:t>
+              <a:t>3/22/2022</a:t>
             </a:fld>
             <a:endParaRPr lang="en-US" dirty="0"/>
           </a:p>
@@ -2776,7 +2780,7 @@
             <a:fld id="{B61BEF0D-F0BB-DE4B-95CE-6DB70DBA9567}" type="datetimeFigureOut">
               <a:rPr lang="en-US" dirty="0"/>
               <a:pPr/>
-              <a:t>3/18/2022</a:t>
+              <a:t>3/22/2022</a:t>
             </a:fld>
             <a:endParaRPr lang="en-US" dirty="0"/>
           </a:p>
@@ -2949,7 +2953,7 @@
             <a:fld id="{B61BEF0D-F0BB-DE4B-95CE-6DB70DBA9567}" type="datetimeFigureOut">
               <a:rPr lang="en-US" dirty="0"/>
               <a:pPr/>
-              <a:t>3/18/2022</a:t>
+              <a:t>3/22/2022</a:t>
             </a:fld>
             <a:endParaRPr lang="en-US" dirty="0"/>
           </a:p>
@@ -3193,7 +3197,7 @@
             <a:fld id="{B61BEF0D-F0BB-DE4B-95CE-6DB70DBA9567}" type="datetimeFigureOut">
               <a:rPr lang="en-US" dirty="0"/>
               <a:pPr/>
-              <a:t>3/18/2022</a:t>
+              <a:t>3/22/2022</a:t>
             </a:fld>
             <a:endParaRPr lang="en-US" dirty="0"/>
           </a:p>
@@ -3421,7 +3425,7 @@
           <a:p>
             <a:fld id="{EB712588-04B1-427B-82EE-E8DB90309F08}" type="datetimeFigureOut">
               <a:rPr lang="en-US" dirty="0"/>
-              <a:t>3/18/2022</a:t>
+              <a:t>3/22/2022</a:t>
             </a:fld>
             <a:endParaRPr lang="en-US" dirty="0"/>
           </a:p>
@@ -3791,7 +3795,7 @@
             <a:fld id="{B61BEF0D-F0BB-DE4B-95CE-6DB70DBA9567}" type="datetimeFigureOut">
               <a:rPr lang="en-US" dirty="0"/>
               <a:pPr/>
-              <a:t>3/18/2022</a:t>
+              <a:t>3/22/2022</a:t>
             </a:fld>
             <a:endParaRPr lang="en-US" dirty="0"/>
           </a:p>
@@ -3911,7 +3915,7 @@
             <a:fld id="{B61BEF0D-F0BB-DE4B-95CE-6DB70DBA9567}" type="datetimeFigureOut">
               <a:rPr lang="en-US" dirty="0"/>
               <a:pPr/>
-              <a:t>3/18/2022</a:t>
+              <a:t>3/22/2022</a:t>
             </a:fld>
             <a:endParaRPr lang="en-US" dirty="0"/>
           </a:p>
@@ -4003,7 +4007,7 @@
             <a:fld id="{B61BEF0D-F0BB-DE4B-95CE-6DB70DBA9567}" type="datetimeFigureOut">
               <a:rPr lang="en-US" dirty="0"/>
               <a:pPr/>
-              <a:t>3/18/2022</a:t>
+              <a:t>3/22/2022</a:t>
             </a:fld>
             <a:endParaRPr lang="en-US" dirty="0"/>
           </a:p>
@@ -4254,7 +4258,7 @@
           <a:p>
             <a:fld id="{42A54C80-263E-416B-A8E0-580EDEADCBDC}" type="datetimeFigureOut">
               <a:rPr lang="en-US" dirty="0"/>
-              <a:t>3/18/2022</a:t>
+              <a:t>3/22/2022</a:t>
             </a:fld>
             <a:endParaRPr lang="en-US" dirty="0"/>
           </a:p>
@@ -4513,7 +4517,7 @@
             <a:fld id="{B61BEF0D-F0BB-DE4B-95CE-6DB70DBA9567}" type="datetimeFigureOut">
               <a:rPr lang="en-US" dirty="0"/>
               <a:pPr/>
-              <a:t>3/18/2022</a:t>
+              <a:t>3/22/2022</a:t>
             </a:fld>
             <a:endParaRPr lang="en-US" dirty="0"/>
           </a:p>
@@ -5253,7 +5257,7 @@
             <a:fld id="{B61BEF0D-F0BB-DE4B-95CE-6DB70DBA9567}" type="datetimeFigureOut">
               <a:rPr lang="en-US" dirty="0"/>
               <a:pPr/>
-              <a:t>3/18/2022</a:t>
+              <a:t>3/22/2022</a:t>
             </a:fld>
             <a:endParaRPr lang="en-US" dirty="0"/>
           </a:p>
@@ -5869,7 +5873,284 @@
             <p:ph type="title"/>
           </p:nvPr>
         </p:nvSpPr>
-        <p:spPr/>
+        <p:spPr>
+          <a:xfrm>
+            <a:off x="669313" y="417095"/>
+            <a:ext cx="8596668" cy="1320800"/>
+          </a:xfrm>
+        </p:spPr>
+        <p:txBody>
+          <a:bodyPr/>
+          <a:lstStyle/>
+          <a:p>
+            <a:r>
+              <a:rPr lang="fr-FR" dirty="0" smtClean="0"/>
+              <a:t>Input</a:t>
+            </a:r>
+            <a:endParaRPr lang="fr-FR" dirty="0"/>
+          </a:p>
+        </p:txBody>
+      </p:sp>
+      <p:pic>
+        <p:nvPicPr>
+          <p:cNvPr id="3" name="Image 2"/>
+          <p:cNvPicPr>
+            <a:picLocks noChangeAspect="1"/>
+          </p:cNvPicPr>
+          <p:nvPr/>
+        </p:nvPicPr>
+        <p:blipFill>
+          <a:blip r:embed="rId2"/>
+          <a:stretch>
+            <a:fillRect/>
+          </a:stretch>
+        </p:blipFill>
+        <p:spPr>
+          <a:xfrm>
+            <a:off x="1457916" y="1561054"/>
+            <a:ext cx="7468642" cy="4201111"/>
+          </a:xfrm>
+          <a:prstGeom prst="rect">
+            <a:avLst/>
+          </a:prstGeom>
+        </p:spPr>
+      </p:pic>
+    </p:spTree>
+    <p:extLst>
+      <p:ext uri="{BB962C8B-B14F-4D97-AF65-F5344CB8AC3E}">
+        <p14:creationId xmlns:p14="http://schemas.microsoft.com/office/powerpoint/2010/main" val="4099947957"/>
+      </p:ext>
+    </p:extLst>
+  </p:cSld>
+  <p:clrMapOvr>
+    <a:masterClrMapping/>
+  </p:clrMapOvr>
+  <p:timing>
+    <p:tnLst>
+      <p:par>
+        <p:cTn id="1" dur="indefinite" restart="never" nodeType="tmRoot"/>
+      </p:par>
+    </p:tnLst>
+  </p:timing>
+</p:sld>
+</file>
+
+<file path=ppt/slides/slide3.xml><?xml version="1.0" encoding="utf-8"?>
+<p:sld xmlns:a="http://schemas.openxmlformats.org/drawingml/2006/main" xmlns:r="http://schemas.openxmlformats.org/officeDocument/2006/relationships" xmlns:p="http://schemas.openxmlformats.org/presentationml/2006/main">
+  <p:cSld>
+    <p:spTree>
+      <p:nvGrpSpPr>
+        <p:cNvPr id="1" name=""/>
+        <p:cNvGrpSpPr/>
+        <p:nvPr/>
+      </p:nvGrpSpPr>
+      <p:grpSpPr>
+        <a:xfrm>
+          <a:off x="0" y="0"/>
+          <a:ext cx="0" cy="0"/>
+          <a:chOff x="0" y="0"/>
+          <a:chExt cx="0" cy="0"/>
+        </a:xfrm>
+      </p:grpSpPr>
+      <p:sp>
+        <p:nvSpPr>
+          <p:cNvPr id="2" name="Titre 1"/>
+          <p:cNvSpPr>
+            <a:spLocks noGrp="1"/>
+          </p:cNvSpPr>
+          <p:nvPr>
+            <p:ph type="title"/>
+          </p:nvPr>
+        </p:nvSpPr>
+        <p:spPr>
+          <a:xfrm>
+            <a:off x="685355" y="481263"/>
+            <a:ext cx="8596668" cy="1320800"/>
+          </a:xfrm>
+        </p:spPr>
+        <p:txBody>
+          <a:bodyPr/>
+          <a:lstStyle/>
+          <a:p>
+            <a:r>
+              <a:rPr lang="fr-FR" dirty="0" err="1"/>
+              <a:t>Pre-process</a:t>
+            </a:r>
+            <a:endParaRPr lang="fr-FR" dirty="0"/>
+          </a:p>
+        </p:txBody>
+      </p:sp>
+      <p:sp>
+        <p:nvSpPr>
+          <p:cNvPr id="3" name="ZoneTexte 2"/>
+          <p:cNvSpPr txBox="1"/>
+          <p:nvPr/>
+        </p:nvSpPr>
+        <p:spPr>
+          <a:xfrm>
+            <a:off x="3503847" y="1281378"/>
+            <a:ext cx="3416969" cy="646331"/>
+          </a:xfrm>
+          <a:prstGeom prst="rect">
+            <a:avLst/>
+          </a:prstGeom>
+          <a:noFill/>
+        </p:spPr>
+        <p:txBody>
+          <a:bodyPr wrap="square" rtlCol="0">
+            <a:spAutoFit/>
+          </a:bodyPr>
+          <a:lstStyle/>
+          <a:p>
+            <a:r>
+              <a:rPr lang="fr-FR" dirty="0" err="1" smtClean="0">
+                <a:latin typeface="Agency FB" panose="020B0503020202020204" pitchFamily="34" charset="0"/>
+              </a:rPr>
+              <a:t>preprocess</a:t>
+            </a:r>
+            <a:r>
+              <a:rPr lang="fr-FR" dirty="0" smtClean="0">
+                <a:latin typeface="Agency FB" panose="020B0503020202020204" pitchFamily="34" charset="0"/>
+              </a:rPr>
+              <a:t>(data, </a:t>
+            </a:r>
+            <a:r>
+              <a:rPr lang="fr-FR" dirty="0" err="1">
+                <a:latin typeface="Agency FB" panose="020B0503020202020204" pitchFamily="34" charset="0"/>
+              </a:rPr>
+              <a:t>maxmiss</a:t>
+            </a:r>
+            <a:r>
+              <a:rPr lang="fr-FR" dirty="0">
+                <a:latin typeface="Agency FB" panose="020B0503020202020204" pitchFamily="34" charset="0"/>
+              </a:rPr>
+              <a:t>=</a:t>
+            </a:r>
+            <a:r>
+              <a:rPr lang="fr-FR" dirty="0">
+                <a:solidFill>
+                  <a:srgbClr val="FF0000"/>
+                </a:solidFill>
+                <a:latin typeface="Agency FB" panose="020B0503020202020204" pitchFamily="34" charset="0"/>
+              </a:rPr>
+              <a:t>30</a:t>
+            </a:r>
+            <a:r>
+              <a:rPr lang="fr-FR" dirty="0">
+                <a:latin typeface="Agency FB" panose="020B0503020202020204" pitchFamily="34" charset="0"/>
+              </a:rPr>
+              <a:t>, </a:t>
+            </a:r>
+            <a:r>
+              <a:rPr lang="fr-FR" dirty="0" err="1">
+                <a:latin typeface="Agency FB" panose="020B0503020202020204" pitchFamily="34" charset="0"/>
+              </a:rPr>
+              <a:t>nchrom</a:t>
+            </a:r>
+            <a:r>
+              <a:rPr lang="fr-FR" dirty="0">
+                <a:latin typeface="Agency FB" panose="020B0503020202020204" pitchFamily="34" charset="0"/>
+              </a:rPr>
+              <a:t>=</a:t>
+            </a:r>
+            <a:r>
+              <a:rPr lang="fr-FR" dirty="0">
+                <a:solidFill>
+                  <a:srgbClr val="FF0000"/>
+                </a:solidFill>
+                <a:latin typeface="Agency FB" panose="020B0503020202020204" pitchFamily="34" charset="0"/>
+              </a:rPr>
+              <a:t>22</a:t>
+            </a:r>
+            <a:r>
+              <a:rPr lang="fr-FR" dirty="0">
+                <a:latin typeface="Agency FB" panose="020B0503020202020204" pitchFamily="34" charset="0"/>
+              </a:rPr>
+              <a:t>)</a:t>
+            </a:r>
+          </a:p>
+          <a:p>
+            <a:endParaRPr lang="fr-FR" dirty="0"/>
+          </a:p>
+        </p:txBody>
+      </p:sp>
+      <p:pic>
+        <p:nvPicPr>
+          <p:cNvPr id="6" name="Image 5"/>
+          <p:cNvPicPr>
+            <a:picLocks noChangeAspect="1"/>
+          </p:cNvPicPr>
+          <p:nvPr/>
+        </p:nvPicPr>
+        <p:blipFill>
+          <a:blip r:embed="rId2"/>
+          <a:stretch>
+            <a:fillRect/>
+          </a:stretch>
+        </p:blipFill>
+        <p:spPr>
+          <a:xfrm>
+            <a:off x="2640902" y="1868872"/>
+            <a:ext cx="5142857" cy="4095238"/>
+          </a:xfrm>
+          <a:prstGeom prst="rect">
+            <a:avLst/>
+          </a:prstGeom>
+        </p:spPr>
+      </p:pic>
+    </p:spTree>
+    <p:extLst>
+      <p:ext uri="{BB962C8B-B14F-4D97-AF65-F5344CB8AC3E}">
+        <p14:creationId xmlns:p14="http://schemas.microsoft.com/office/powerpoint/2010/main" val="4048697289"/>
+      </p:ext>
+    </p:extLst>
+  </p:cSld>
+  <p:clrMapOvr>
+    <a:masterClrMapping/>
+  </p:clrMapOvr>
+  <p:timing>
+    <p:tnLst>
+      <p:par>
+        <p:cTn id="1" dur="indefinite" restart="never" nodeType="tmRoot"/>
+      </p:par>
+    </p:tnLst>
+  </p:timing>
+</p:sld>
+</file>
+
+<file path=ppt/slides/slide4.xml><?xml version="1.0" encoding="utf-8"?>
+<p:sld xmlns:a="http://schemas.openxmlformats.org/drawingml/2006/main" xmlns:r="http://schemas.openxmlformats.org/officeDocument/2006/relationships" xmlns:p="http://schemas.openxmlformats.org/presentationml/2006/main">
+  <p:cSld>
+    <p:spTree>
+      <p:nvGrpSpPr>
+        <p:cNvPr id="1" name=""/>
+        <p:cNvGrpSpPr/>
+        <p:nvPr/>
+      </p:nvGrpSpPr>
+      <p:grpSpPr>
+        <a:xfrm>
+          <a:off x="0" y="0"/>
+          <a:ext cx="0" cy="0"/>
+          <a:chOff x="0" y="0"/>
+          <a:chExt cx="0" cy="0"/>
+        </a:xfrm>
+      </p:grpSpPr>
+      <p:sp>
+        <p:nvSpPr>
+          <p:cNvPr id="2" name="Titre 1"/>
+          <p:cNvSpPr>
+            <a:spLocks noGrp="1"/>
+          </p:cNvSpPr>
+          <p:nvPr>
+            <p:ph type="title"/>
+          </p:nvPr>
+        </p:nvSpPr>
+        <p:spPr>
+          <a:xfrm>
+            <a:off x="685355" y="481263"/>
+            <a:ext cx="8596668" cy="1320800"/>
+          </a:xfrm>
+        </p:spPr>
         <p:txBody>
           <a:bodyPr/>
           <a:lstStyle/>
@@ -5905,15 +6186,502 @@
         </p:blipFill>
         <p:spPr>
           <a:xfrm>
-            <a:off x="2740498" y="1721852"/>
+            <a:off x="2331424" y="1605898"/>
             <a:ext cx="5761818" cy="4590249"/>
           </a:xfrm>
         </p:spPr>
       </p:pic>
+      <p:sp>
+        <p:nvSpPr>
+          <p:cNvPr id="3" name="ZoneTexte 2"/>
+          <p:cNvSpPr txBox="1"/>
+          <p:nvPr/>
+        </p:nvSpPr>
+        <p:spPr>
+          <a:xfrm>
+            <a:off x="2673626" y="1434418"/>
+            <a:ext cx="4620126" cy="369332"/>
+          </a:xfrm>
+          <a:prstGeom prst="rect">
+            <a:avLst/>
+          </a:prstGeom>
+          <a:noFill/>
+        </p:spPr>
+        <p:txBody>
+          <a:bodyPr wrap="square" rtlCol="0">
+            <a:spAutoFit/>
+          </a:bodyPr>
+          <a:lstStyle/>
+          <a:p>
+            <a:r>
+              <a:rPr lang="fr-FR" dirty="0" err="1" smtClean="0">
+                <a:latin typeface="Agency FB" panose="020B0503020202020204" pitchFamily="34" charset="0"/>
+              </a:rPr>
+              <a:t>normalize</a:t>
+            </a:r>
+            <a:r>
+              <a:rPr lang="fr-FR" dirty="0" smtClean="0">
+                <a:latin typeface="Agency FB" panose="020B0503020202020204" pitchFamily="34" charset="0"/>
+              </a:rPr>
+              <a:t>(data</a:t>
+            </a:r>
+            <a:r>
+              <a:rPr lang="fr-FR" dirty="0">
+                <a:latin typeface="Agency FB" panose="020B0503020202020204" pitchFamily="34" charset="0"/>
+              </a:rPr>
+              <a:t>, </a:t>
+            </a:r>
+            <a:r>
+              <a:rPr lang="fr-FR" dirty="0" err="1">
+                <a:latin typeface="Agency FB" panose="020B0503020202020204" pitchFamily="34" charset="0"/>
+              </a:rPr>
+              <a:t>method</a:t>
+            </a:r>
+            <a:r>
+              <a:rPr lang="fr-FR" dirty="0">
+                <a:latin typeface="Agency FB" panose="020B0503020202020204" pitchFamily="34" charset="0"/>
+              </a:rPr>
+              <a:t>="</a:t>
+            </a:r>
+            <a:r>
+              <a:rPr lang="fr-FR" dirty="0" err="1">
+                <a:solidFill>
+                  <a:srgbClr val="FF0000"/>
+                </a:solidFill>
+                <a:latin typeface="Agency FB" panose="020B0503020202020204" pitchFamily="34" charset="0"/>
+              </a:rPr>
+              <a:t>median</a:t>
+            </a:r>
+            <a:r>
+              <a:rPr lang="fr-FR" dirty="0">
+                <a:latin typeface="Agency FB" panose="020B0503020202020204" pitchFamily="34" charset="0"/>
+              </a:rPr>
+              <a:t>", </a:t>
+            </a:r>
+            <a:r>
+              <a:rPr lang="fr-FR" dirty="0" err="1">
+                <a:latin typeface="Agency FB" panose="020B0503020202020204" pitchFamily="34" charset="0"/>
+              </a:rPr>
+              <a:t>smoothOutliers</a:t>
+            </a:r>
+            <a:r>
+              <a:rPr lang="fr-FR" dirty="0">
+                <a:latin typeface="Agency FB" panose="020B0503020202020204" pitchFamily="34" charset="0"/>
+              </a:rPr>
+              <a:t>=</a:t>
+            </a:r>
+            <a:r>
+              <a:rPr lang="fr-FR" dirty="0">
+                <a:solidFill>
+                  <a:srgbClr val="FF0000"/>
+                </a:solidFill>
+                <a:latin typeface="Agency FB" panose="020B0503020202020204" pitchFamily="34" charset="0"/>
+              </a:rPr>
+              <a:t>TRUE</a:t>
+            </a:r>
+            <a:r>
+              <a:rPr lang="fr-FR" dirty="0">
+                <a:latin typeface="Agency FB" panose="020B0503020202020204" pitchFamily="34" charset="0"/>
+              </a:rPr>
+              <a:t>)</a:t>
+            </a:r>
+            <a:endParaRPr lang="fr-FR" dirty="0"/>
+          </a:p>
+        </p:txBody>
+      </p:sp>
     </p:spTree>
     <p:extLst>
       <p:ext uri="{BB962C8B-B14F-4D97-AF65-F5344CB8AC3E}">
         <p14:creationId xmlns:p14="http://schemas.microsoft.com/office/powerpoint/2010/main" val="845266628"/>
+      </p:ext>
+    </p:extLst>
+  </p:cSld>
+  <p:clrMapOvr>
+    <a:masterClrMapping/>
+  </p:clrMapOvr>
+  <p:timing>
+    <p:tnLst>
+      <p:par>
+        <p:cTn id="1" dur="indefinite" restart="never" nodeType="tmRoot"/>
+      </p:par>
+    </p:tnLst>
+  </p:timing>
+</p:sld>
+</file>
+
+<file path=ppt/slides/slide5.xml><?xml version="1.0" encoding="utf-8"?>
+<p:sld xmlns:a="http://schemas.openxmlformats.org/drawingml/2006/main" xmlns:r="http://schemas.openxmlformats.org/officeDocument/2006/relationships" xmlns:p="http://schemas.openxmlformats.org/presentationml/2006/main">
+  <p:cSld>
+    <p:spTree>
+      <p:nvGrpSpPr>
+        <p:cNvPr id="1" name=""/>
+        <p:cNvGrpSpPr/>
+        <p:nvPr/>
+      </p:nvGrpSpPr>
+      <p:grpSpPr>
+        <a:xfrm>
+          <a:off x="0" y="0"/>
+          <a:ext cx="0" cy="0"/>
+          <a:chOff x="0" y="0"/>
+          <a:chExt cx="0" cy="0"/>
+        </a:xfrm>
+      </p:grpSpPr>
+      <p:sp>
+        <p:nvSpPr>
+          <p:cNvPr id="2" name="Titre 1"/>
+          <p:cNvSpPr>
+            <a:spLocks noGrp="1"/>
+          </p:cNvSpPr>
+          <p:nvPr>
+            <p:ph type="title"/>
+          </p:nvPr>
+        </p:nvSpPr>
+        <p:spPr>
+          <a:xfrm>
+            <a:off x="685355" y="481263"/>
+            <a:ext cx="8596668" cy="1320800"/>
+          </a:xfrm>
+        </p:spPr>
+        <p:txBody>
+          <a:bodyPr/>
+          <a:lstStyle/>
+          <a:p>
+            <a:r>
+              <a:rPr lang="fr-FR" dirty="0" smtClean="0"/>
+              <a:t>Segmentation</a:t>
+            </a:r>
+            <a:br>
+              <a:rPr lang="fr-FR" dirty="0" smtClean="0"/>
+            </a:br>
+            <a:endParaRPr lang="fr-FR" dirty="0"/>
+          </a:p>
+        </p:txBody>
+      </p:sp>
+      <p:sp>
+        <p:nvSpPr>
+          <p:cNvPr id="3" name="ZoneTexte 2"/>
+          <p:cNvSpPr txBox="1"/>
+          <p:nvPr/>
+        </p:nvSpPr>
+        <p:spPr>
+          <a:xfrm>
+            <a:off x="1123513" y="1427328"/>
+            <a:ext cx="7720351" cy="369332"/>
+          </a:xfrm>
+          <a:prstGeom prst="rect">
+            <a:avLst/>
+          </a:prstGeom>
+          <a:noFill/>
+        </p:spPr>
+        <p:txBody>
+          <a:bodyPr wrap="square" rtlCol="0">
+            <a:spAutoFit/>
+          </a:bodyPr>
+          <a:lstStyle/>
+          <a:p>
+            <a:r>
+              <a:rPr lang="fr-FR" dirty="0" err="1" smtClean="0">
+                <a:latin typeface="Agency FB" panose="020B0503020202020204" pitchFamily="34" charset="0"/>
+              </a:rPr>
+              <a:t>segmentData</a:t>
+            </a:r>
+            <a:r>
+              <a:rPr lang="fr-FR" dirty="0" smtClean="0">
+                <a:latin typeface="Agency FB" panose="020B0503020202020204" pitchFamily="34" charset="0"/>
+              </a:rPr>
+              <a:t>(data, </a:t>
+            </a:r>
+            <a:r>
+              <a:rPr lang="fr-FR" dirty="0" err="1">
+                <a:latin typeface="Agency FB" panose="020B0503020202020204" pitchFamily="34" charset="0"/>
+              </a:rPr>
+              <a:t>method</a:t>
+            </a:r>
+            <a:r>
+              <a:rPr lang="fr-FR" dirty="0">
+                <a:latin typeface="Agency FB" panose="020B0503020202020204" pitchFamily="34" charset="0"/>
+              </a:rPr>
+              <a:t>="</a:t>
+            </a:r>
+            <a:r>
+              <a:rPr lang="fr-FR" dirty="0" err="1">
+                <a:solidFill>
+                  <a:srgbClr val="FF0000"/>
+                </a:solidFill>
+                <a:latin typeface="Agency FB" panose="020B0503020202020204" pitchFamily="34" charset="0"/>
+              </a:rPr>
+              <a:t>DNAcopy</a:t>
+            </a:r>
+            <a:r>
+              <a:rPr lang="fr-FR" dirty="0">
+                <a:latin typeface="Agency FB" panose="020B0503020202020204" pitchFamily="34" charset="0"/>
+              </a:rPr>
+              <a:t>",</a:t>
+            </a:r>
+            <a:r>
+              <a:rPr lang="fr-FR" dirty="0" err="1">
+                <a:latin typeface="Agency FB" panose="020B0503020202020204" pitchFamily="34" charset="0"/>
+              </a:rPr>
+              <a:t>undo.splits</a:t>
+            </a:r>
+            <a:r>
+              <a:rPr lang="fr-FR" dirty="0">
+                <a:latin typeface="Agency FB" panose="020B0503020202020204" pitchFamily="34" charset="0"/>
+              </a:rPr>
+              <a:t>="</a:t>
+            </a:r>
+            <a:r>
+              <a:rPr lang="fr-FR" dirty="0" err="1">
+                <a:solidFill>
+                  <a:srgbClr val="FF0000"/>
+                </a:solidFill>
+                <a:latin typeface="Agency FB" panose="020B0503020202020204" pitchFamily="34" charset="0"/>
+              </a:rPr>
+              <a:t>sdundo</a:t>
+            </a:r>
+            <a:r>
+              <a:rPr lang="fr-FR" dirty="0">
+                <a:latin typeface="Agency FB" panose="020B0503020202020204" pitchFamily="34" charset="0"/>
+              </a:rPr>
+              <a:t>",undo.SD=</a:t>
+            </a:r>
+            <a:r>
+              <a:rPr lang="fr-FR" dirty="0">
+                <a:solidFill>
+                  <a:srgbClr val="FF0000"/>
+                </a:solidFill>
+                <a:latin typeface="Agency FB" panose="020B0503020202020204" pitchFamily="34" charset="0"/>
+              </a:rPr>
+              <a:t>3</a:t>
+            </a:r>
+            <a:r>
+              <a:rPr lang="fr-FR" dirty="0">
+                <a:latin typeface="Agency FB" panose="020B0503020202020204" pitchFamily="34" charset="0"/>
+              </a:rPr>
+              <a:t>, </a:t>
+            </a:r>
+            <a:r>
+              <a:rPr lang="fr-FR" dirty="0" err="1">
+                <a:latin typeface="Agency FB" panose="020B0503020202020204" pitchFamily="34" charset="0"/>
+              </a:rPr>
+              <a:t>clen</a:t>
+            </a:r>
+            <a:r>
+              <a:rPr lang="fr-FR" dirty="0">
+                <a:latin typeface="Agency FB" panose="020B0503020202020204" pitchFamily="34" charset="0"/>
+              </a:rPr>
+              <a:t>=</a:t>
+            </a:r>
+            <a:r>
+              <a:rPr lang="fr-FR" dirty="0">
+                <a:solidFill>
+                  <a:srgbClr val="FF0000"/>
+                </a:solidFill>
+                <a:latin typeface="Agency FB" panose="020B0503020202020204" pitchFamily="34" charset="0"/>
+              </a:rPr>
+              <a:t>10</a:t>
+            </a:r>
+            <a:r>
+              <a:rPr lang="fr-FR" dirty="0">
+                <a:latin typeface="Agency FB" panose="020B0503020202020204" pitchFamily="34" charset="0"/>
+              </a:rPr>
+              <a:t>, </a:t>
+            </a:r>
+            <a:r>
+              <a:rPr lang="fr-FR" dirty="0" err="1">
+                <a:latin typeface="Agency FB" panose="020B0503020202020204" pitchFamily="34" charset="0"/>
+              </a:rPr>
+              <a:t>relSDlong</a:t>
+            </a:r>
+            <a:r>
+              <a:rPr lang="fr-FR" dirty="0">
+                <a:latin typeface="Agency FB" panose="020B0503020202020204" pitchFamily="34" charset="0"/>
+              </a:rPr>
+              <a:t>=</a:t>
+            </a:r>
+            <a:r>
+              <a:rPr lang="fr-FR" dirty="0">
+                <a:solidFill>
+                  <a:srgbClr val="FF0000"/>
+                </a:solidFill>
+                <a:latin typeface="Agency FB" panose="020B0503020202020204" pitchFamily="34" charset="0"/>
+              </a:rPr>
+              <a:t>5</a:t>
+            </a:r>
+            <a:r>
+              <a:rPr lang="fr-FR" dirty="0">
+                <a:latin typeface="Agency FB" panose="020B0503020202020204" pitchFamily="34" charset="0"/>
+              </a:rPr>
+              <a:t>)</a:t>
+            </a:r>
+          </a:p>
+        </p:txBody>
+      </p:sp>
+      <p:sp>
+        <p:nvSpPr>
+          <p:cNvPr id="6" name="Espace réservé du contenu 5"/>
+          <p:cNvSpPr>
+            <a:spLocks noGrp="1"/>
+          </p:cNvSpPr>
+          <p:nvPr>
+            <p:ph idx="1"/>
+          </p:nvPr>
+        </p:nvSpPr>
+        <p:spPr/>
+        <p:txBody>
+          <a:bodyPr/>
+          <a:lstStyle/>
+          <a:p>
+            <a:endParaRPr lang="fr-FR"/>
+          </a:p>
+        </p:txBody>
+      </p:sp>
+    </p:spTree>
+    <p:extLst>
+      <p:ext uri="{BB962C8B-B14F-4D97-AF65-F5344CB8AC3E}">
+        <p14:creationId xmlns:p14="http://schemas.microsoft.com/office/powerpoint/2010/main" val="2768489143"/>
+      </p:ext>
+    </p:extLst>
+  </p:cSld>
+  <p:clrMapOvr>
+    <a:masterClrMapping/>
+  </p:clrMapOvr>
+  <p:timing>
+    <p:tnLst>
+      <p:par>
+        <p:cTn id="1" dur="indefinite" restart="never" nodeType="tmRoot"/>
+      </p:par>
+    </p:tnLst>
+  </p:timing>
+</p:sld>
+</file>
+
+<file path=ppt/slides/slide6.xml><?xml version="1.0" encoding="utf-8"?>
+<p:sld xmlns:a="http://schemas.openxmlformats.org/drawingml/2006/main" xmlns:r="http://schemas.openxmlformats.org/officeDocument/2006/relationships" xmlns:p="http://schemas.openxmlformats.org/presentationml/2006/main">
+  <p:cSld>
+    <p:spTree>
+      <p:nvGrpSpPr>
+        <p:cNvPr id="1" name=""/>
+        <p:cNvGrpSpPr/>
+        <p:nvPr/>
+      </p:nvGrpSpPr>
+      <p:grpSpPr>
+        <a:xfrm>
+          <a:off x="0" y="0"/>
+          <a:ext cx="0" cy="0"/>
+          <a:chOff x="0" y="0"/>
+          <a:chExt cx="0" cy="0"/>
+        </a:xfrm>
+      </p:grpSpPr>
+      <p:sp>
+        <p:nvSpPr>
+          <p:cNvPr id="2" name="Titre 1"/>
+          <p:cNvSpPr>
+            <a:spLocks noGrp="1"/>
+          </p:cNvSpPr>
+          <p:nvPr>
+            <p:ph type="title"/>
+          </p:nvPr>
+        </p:nvSpPr>
+        <p:spPr>
+          <a:xfrm>
+            <a:off x="685355" y="481263"/>
+            <a:ext cx="8596668" cy="1320800"/>
+          </a:xfrm>
+        </p:spPr>
+        <p:txBody>
+          <a:bodyPr>
+            <a:normAutofit fontScale="90000"/>
+          </a:bodyPr>
+          <a:lstStyle/>
+          <a:p>
+            <a:r>
+              <a:rPr lang="fr-FR" dirty="0" smtClean="0"/>
+              <a:t>Deuxième normalisation</a:t>
+            </a:r>
+            <a:br>
+              <a:rPr lang="fr-FR" dirty="0" smtClean="0"/>
+            </a:br>
+            <a:r>
+              <a:rPr lang="fr-FR" dirty="0" smtClean="0"/>
+              <a:t/>
+            </a:r>
+            <a:br>
+              <a:rPr lang="fr-FR" dirty="0" smtClean="0"/>
+            </a:br>
+            <a:endParaRPr lang="fr-FR" dirty="0"/>
+          </a:p>
+        </p:txBody>
+      </p:sp>
+      <p:sp>
+        <p:nvSpPr>
+          <p:cNvPr id="3" name="ZoneTexte 2"/>
+          <p:cNvSpPr txBox="1"/>
+          <p:nvPr/>
+        </p:nvSpPr>
+        <p:spPr>
+          <a:xfrm>
+            <a:off x="1123513" y="1427328"/>
+            <a:ext cx="7720351" cy="369332"/>
+          </a:xfrm>
+          <a:prstGeom prst="rect">
+            <a:avLst/>
+          </a:prstGeom>
+          <a:noFill/>
+        </p:spPr>
+        <p:txBody>
+          <a:bodyPr wrap="square" rtlCol="0">
+            <a:spAutoFit/>
+          </a:bodyPr>
+          <a:lstStyle/>
+          <a:p>
+            <a:r>
+              <a:rPr lang="fr-FR" dirty="0">
+                <a:latin typeface="Agency FB" panose="020B0503020202020204" pitchFamily="34" charset="0"/>
+              </a:rPr>
+              <a:t> </a:t>
+            </a:r>
+            <a:r>
+              <a:rPr lang="fr-FR" dirty="0" err="1" smtClean="0">
+                <a:latin typeface="Agency FB" panose="020B0503020202020204" pitchFamily="34" charset="0"/>
+              </a:rPr>
+              <a:t>postsegnormalize</a:t>
+            </a:r>
+            <a:r>
+              <a:rPr lang="fr-FR" dirty="0" smtClean="0">
+                <a:latin typeface="Agency FB" panose="020B0503020202020204" pitchFamily="34" charset="0"/>
+              </a:rPr>
+              <a:t>(data)</a:t>
+            </a:r>
+            <a:endParaRPr lang="fr-FR" dirty="0">
+              <a:latin typeface="Agency FB" panose="020B0503020202020204" pitchFamily="34" charset="0"/>
+            </a:endParaRPr>
+          </a:p>
+        </p:txBody>
+      </p:sp>
+      <p:sp>
+        <p:nvSpPr>
+          <p:cNvPr id="4" name="Espace réservé du contenu 3"/>
+          <p:cNvSpPr>
+            <a:spLocks noGrp="1"/>
+          </p:cNvSpPr>
+          <p:nvPr>
+            <p:ph idx="1"/>
+          </p:nvPr>
+        </p:nvSpPr>
+        <p:spPr/>
+        <p:txBody>
+          <a:bodyPr/>
+          <a:lstStyle/>
+          <a:p>
+            <a:endParaRPr lang="fr-FR" dirty="0"/>
+          </a:p>
+        </p:txBody>
+      </p:sp>
+    </p:spTree>
+    <p:extLst>
+      <p:ext uri="{BB962C8B-B14F-4D97-AF65-F5344CB8AC3E}">
+        <p14:creationId xmlns:p14="http://schemas.microsoft.com/office/powerpoint/2010/main" val="701775868"/>
       </p:ext>
     </p:extLst>
   </p:cSld>

</xml_diff>